<commit_message>
Aggiunta introduzione Server (manca tutto il resto)
</commit_message>
<xml_diff>
--- a/Presentazione.pptx
+++ b/Presentazione.pptx
@@ -139,7 +139,7 @@
 <file path=ppt/revisionInfo.xml><?xml version="1.0" encoding="utf-8"?>
 <p1510:revInfo xmlns:a="http://schemas.openxmlformats.org/drawingml/2006/main" xmlns:r="http://schemas.openxmlformats.org/officeDocument/2006/relationships" xmlns:p1510="http://schemas.microsoft.com/office/powerpoint/2015/10/main">
   <p1510:revLst>
-    <p1510:client id="{EFE42744-1AC9-4DA8-BDA8-8DC671FA1384}" v="2" dt="2019-12-11T18:18:53.147"/>
+    <p1510:client id="{EFE42744-1AC9-4DA8-BDA8-8DC671FA1384}" v="11" dt="2019-12-11T22:24:06.405"/>
   </p1510:revLst>
 </p1510:revInfo>
 </file>
@@ -317,8 +317,8 @@
   </pc:docChgLst>
   <pc:docChgLst>
     <pc:chgData name="Andrei Daniel Ivan" userId="d3c4cde5a19fb9a3" providerId="LiveId" clId="{EFE42744-1AC9-4DA8-BDA8-8DC671FA1384}"/>
-    <pc:docChg chg="custSel addSld delSld modSld sldOrd">
-      <pc:chgData name="Andrei Daniel Ivan" userId="d3c4cde5a19fb9a3" providerId="LiveId" clId="{EFE42744-1AC9-4DA8-BDA8-8DC671FA1384}" dt="2019-12-11T18:19:08.162" v="80" actId="2696"/>
+    <pc:docChg chg="undo custSel addSld delSld modSld sldOrd">
+      <pc:chgData name="Andrei Daniel Ivan" userId="d3c4cde5a19fb9a3" providerId="LiveId" clId="{EFE42744-1AC9-4DA8-BDA8-8DC671FA1384}" dt="2019-12-11T22:26:31.974" v="810" actId="20577"/>
       <pc:docMkLst>
         <pc:docMk/>
       </pc:docMkLst>
@@ -337,14 +337,14 @@
           </ac:spMkLst>
         </pc:spChg>
       </pc:sldChg>
-      <pc:sldChg chg="modSp">
-        <pc:chgData name="Andrei Daniel Ivan" userId="d3c4cde5a19fb9a3" providerId="LiveId" clId="{EFE42744-1AC9-4DA8-BDA8-8DC671FA1384}" dt="2019-12-11T18:18:40.090" v="66" actId="20577"/>
+      <pc:sldChg chg="addSp delSp modSp">
+        <pc:chgData name="Andrei Daniel Ivan" userId="d3c4cde5a19fb9a3" providerId="LiveId" clId="{EFE42744-1AC9-4DA8-BDA8-8DC671FA1384}" dt="2019-12-11T22:26:31.974" v="810" actId="20577"/>
         <pc:sldMkLst>
           <pc:docMk/>
           <pc:sldMk cId="148092493" sldId="264"/>
         </pc:sldMkLst>
-        <pc:spChg chg="mod">
-          <ac:chgData name="Andrei Daniel Ivan" userId="d3c4cde5a19fb9a3" providerId="LiveId" clId="{EFE42744-1AC9-4DA8-BDA8-8DC671FA1384}" dt="2019-12-11T18:18:40.090" v="66" actId="20577"/>
+        <pc:spChg chg="add del mod">
+          <ac:chgData name="Andrei Daniel Ivan" userId="d3c4cde5a19fb9a3" providerId="LiveId" clId="{EFE42744-1AC9-4DA8-BDA8-8DC671FA1384}" dt="2019-12-11T22:26:31.974" v="810" actId="20577"/>
           <ac:spMkLst>
             <pc:docMk/>
             <pc:sldMk cId="148092493" sldId="264"/>
@@ -5498,7 +5498,7 @@
         <p:spPr>
           <a:xfrm>
             <a:off x="882212" y="1003301"/>
-            <a:ext cx="10427575" cy="461088"/>
+            <a:ext cx="10427575" cy="3092578"/>
           </a:xfrm>
           <a:prstGeom prst="rect">
             <a:avLst/>
@@ -5520,7 +5520,7 @@
               </a:spcAft>
             </a:pPr>
             <a:r>
-              <a:rPr lang="it-IT" dirty="0">
+              <a:rPr lang="it-IT" sz="1600" dirty="0">
                 <a:solidFill>
                   <a:schemeClr val="bg1"/>
                 </a:solidFill>
@@ -5528,10 +5528,21 @@
                 <a:ea typeface="Calibri" panose="020F0502020204030204" pitchFamily="34" charset="0"/>
                 <a:cs typeface="Times New Roman" panose="02020603050405020304" pitchFamily="18" charset="0"/>
               </a:rPr>
-              <a:t>To be </a:t>
-            </a:r>
-            <a:r>
-              <a:rPr lang="it-IT" dirty="0" err="1">
+              <a:t>Per il </a:t>
+            </a:r>
+            <a:r>
+              <a:rPr lang="it-IT" sz="1600" dirty="0">
+                <a:solidFill>
+                  <a:srgbClr val="00B0F0"/>
+                </a:solidFill>
+                <a:latin typeface="Avenir Next LT Pro Light" panose="020B0304020202020204" pitchFamily="34" charset="0"/>
+                <a:ea typeface="Calibri" panose="020F0502020204030204" pitchFamily="34" charset="0"/>
+                <a:cs typeface="Times New Roman" panose="02020603050405020304" pitchFamily="18" charset="0"/>
+              </a:rPr>
+              <a:t>Server</a:t>
+            </a:r>
+            <a:r>
+              <a:rPr lang="it-IT" sz="1600" dirty="0">
                 <a:solidFill>
                   <a:schemeClr val="bg1"/>
                 </a:solidFill>
@@ -5539,10 +5550,143 @@
                 <a:ea typeface="Calibri" panose="020F0502020204030204" pitchFamily="34" charset="0"/>
                 <a:cs typeface="Times New Roman" panose="02020603050405020304" pitchFamily="18" charset="0"/>
               </a:rPr>
-              <a:t>defined</a:t>
-            </a:r>
-            <a:r>
-              <a:rPr lang="it-IT" dirty="0">
+              <a:t> si genera una tabella, come da specifica, con valori parzialmente casuali.</a:t>
+            </a:r>
+          </a:p>
+          <a:p>
+            <a:pPr algn="just">
+              <a:lnSpc>
+                <a:spcPct val="150000"/>
+              </a:lnSpc>
+            </a:pPr>
+            <a:r>
+              <a:rPr lang="it-IT" sz="1600" dirty="0">
+                <a:solidFill>
+                  <a:schemeClr val="accent6"/>
+                </a:solidFill>
+                <a:latin typeface="Consolas" panose="020B0609020204030204" pitchFamily="49" charset="0"/>
+              </a:rPr>
+              <a:t>Output</a:t>
+            </a:r>
+            <a:r>
+              <a:rPr lang="it-IT" sz="1600" dirty="0">
+                <a:solidFill>
+                  <a:srgbClr val="D4D4D4"/>
+                </a:solidFill>
+                <a:latin typeface="Consolas" panose="020B0609020204030204" pitchFamily="49" charset="0"/>
+              </a:rPr>
+              <a:t> *</a:t>
+            </a:r>
+            <a:r>
+              <a:rPr lang="it-IT" sz="1600" dirty="0">
+                <a:solidFill>
+                  <a:srgbClr val="DCDCAA"/>
+                </a:solidFill>
+                <a:latin typeface="Consolas" panose="020B0609020204030204" pitchFamily="49" charset="0"/>
+              </a:rPr>
+              <a:t>classifica_giudici_1_svc</a:t>
+            </a:r>
+            <a:r>
+              <a:rPr lang="it-IT" sz="1600" dirty="0">
+                <a:solidFill>
+                  <a:srgbClr val="D4D4D4"/>
+                </a:solidFill>
+                <a:latin typeface="Consolas" panose="020B0609020204030204" pitchFamily="49" charset="0"/>
+              </a:rPr>
+              <a:t>(</a:t>
+            </a:r>
+            <a:r>
+              <a:rPr lang="it-IT" sz="1600" dirty="0" err="1">
+                <a:solidFill>
+                  <a:srgbClr val="569CD6"/>
+                </a:solidFill>
+                <a:latin typeface="Consolas" panose="020B0609020204030204" pitchFamily="49" charset="0"/>
+              </a:rPr>
+              <a:t>void</a:t>
+            </a:r>
+            <a:r>
+              <a:rPr lang="it-IT" sz="1600" dirty="0">
+                <a:solidFill>
+                  <a:srgbClr val="D4D4D4"/>
+                </a:solidFill>
+                <a:latin typeface="Consolas" panose="020B0609020204030204" pitchFamily="49" charset="0"/>
+              </a:rPr>
+              <a:t> *</a:t>
+            </a:r>
+            <a:r>
+              <a:rPr lang="it-IT" sz="1600" dirty="0">
+                <a:solidFill>
+                  <a:srgbClr val="9CDCFE"/>
+                </a:solidFill>
+                <a:latin typeface="Consolas" panose="020B0609020204030204" pitchFamily="49" charset="0"/>
+              </a:rPr>
+              <a:t>in</a:t>
+            </a:r>
+            <a:r>
+              <a:rPr lang="it-IT" sz="1600" dirty="0">
+                <a:solidFill>
+                  <a:srgbClr val="D4D4D4"/>
+                </a:solidFill>
+                <a:latin typeface="Consolas" panose="020B0609020204030204" pitchFamily="49" charset="0"/>
+              </a:rPr>
+              <a:t>, </a:t>
+            </a:r>
+            <a:r>
+              <a:rPr lang="it-IT" sz="1600" dirty="0" err="1">
+                <a:solidFill>
+                  <a:srgbClr val="569CD6"/>
+                </a:solidFill>
+                <a:latin typeface="Consolas" panose="020B0609020204030204" pitchFamily="49" charset="0"/>
+              </a:rPr>
+              <a:t>struct</a:t>
+            </a:r>
+            <a:r>
+              <a:rPr lang="it-IT" sz="1600" dirty="0">
+                <a:solidFill>
+                  <a:srgbClr val="D4D4D4"/>
+                </a:solidFill>
+                <a:latin typeface="Consolas" panose="020B0609020204030204" pitchFamily="49" charset="0"/>
+              </a:rPr>
+              <a:t> </a:t>
+            </a:r>
+            <a:r>
+              <a:rPr lang="it-IT" sz="1600" dirty="0" err="1">
+                <a:solidFill>
+                  <a:schemeClr val="accent6"/>
+                </a:solidFill>
+                <a:latin typeface="Consolas" panose="020B0609020204030204" pitchFamily="49" charset="0"/>
+              </a:rPr>
+              <a:t>svc_req</a:t>
+            </a:r>
+            <a:r>
+              <a:rPr lang="it-IT" sz="1600" dirty="0">
+                <a:solidFill>
+                  <a:srgbClr val="D4D4D4"/>
+                </a:solidFill>
+                <a:latin typeface="Consolas" panose="020B0609020204030204" pitchFamily="49" charset="0"/>
+              </a:rPr>
+              <a:t> *</a:t>
+            </a:r>
+            <a:r>
+              <a:rPr lang="it-IT" sz="1600" dirty="0" err="1">
+                <a:solidFill>
+                  <a:srgbClr val="9CDCFE"/>
+                </a:solidFill>
+                <a:latin typeface="Consolas" panose="020B0609020204030204" pitchFamily="49" charset="0"/>
+              </a:rPr>
+              <a:t>rqstp</a:t>
+            </a:r>
+            <a:r>
+              <a:rPr lang="it-IT" sz="1600" dirty="0">
+                <a:solidFill>
+                  <a:srgbClr val="D4D4D4"/>
+                </a:solidFill>
+                <a:latin typeface="Consolas" panose="020B0609020204030204" pitchFamily="49" charset="0"/>
+              </a:rPr>
+              <a:t>)</a:t>
+            </a:r>
+            <a:r>
+              <a:rPr lang="it-IT" sz="1600" dirty="0">
                 <a:solidFill>
                   <a:schemeClr val="bg1"/>
                 </a:solidFill>
@@ -5550,8 +5694,219 @@
                 <a:ea typeface="Calibri" panose="020F0502020204030204" pitchFamily="34" charset="0"/>
                 <a:cs typeface="Times New Roman" panose="02020603050405020304" pitchFamily="18" charset="0"/>
               </a:rPr>
-              <a:t>.</a:t>
-            </a:r>
+              <a:t>: per ogni giudice viene calcolato il punteggio in base ai partecipanti e successivamente viene ordinato il risultato, restituendo al Client l’array ordinato di Giudici.</a:t>
+            </a:r>
+          </a:p>
+          <a:p>
+            <a:pPr algn="just">
+              <a:lnSpc>
+                <a:spcPct val="150000"/>
+              </a:lnSpc>
+            </a:pPr>
+            <a:r>
+              <a:rPr lang="it-IT" sz="1600" dirty="0" err="1">
+                <a:solidFill>
+                  <a:srgbClr val="569CD6"/>
+                </a:solidFill>
+                <a:latin typeface="Consolas" panose="020B0609020204030204" pitchFamily="49" charset="0"/>
+              </a:rPr>
+              <a:t>int</a:t>
+            </a:r>
+            <a:r>
+              <a:rPr lang="it-IT" sz="1600" dirty="0">
+                <a:solidFill>
+                  <a:srgbClr val="D4D4D4"/>
+                </a:solidFill>
+                <a:latin typeface="Consolas" panose="020B0609020204030204" pitchFamily="49" charset="0"/>
+              </a:rPr>
+              <a:t> *</a:t>
+            </a:r>
+            <a:r>
+              <a:rPr lang="it-IT" sz="1600" dirty="0">
+                <a:solidFill>
+                  <a:srgbClr val="DCDCAA"/>
+                </a:solidFill>
+                <a:latin typeface="Consolas" panose="020B0609020204030204" pitchFamily="49" charset="0"/>
+              </a:rPr>
+              <a:t>esprimi_voto_1_svc</a:t>
+            </a:r>
+            <a:r>
+              <a:rPr lang="it-IT" sz="1600" dirty="0">
+                <a:solidFill>
+                  <a:srgbClr val="D4D4D4"/>
+                </a:solidFill>
+                <a:latin typeface="Consolas" panose="020B0609020204030204" pitchFamily="49" charset="0"/>
+              </a:rPr>
+              <a:t>(</a:t>
+            </a:r>
+            <a:r>
+              <a:rPr lang="it-IT" sz="1600" dirty="0">
+                <a:solidFill>
+                  <a:schemeClr val="accent6"/>
+                </a:solidFill>
+                <a:latin typeface="Consolas" panose="020B0609020204030204" pitchFamily="49" charset="0"/>
+              </a:rPr>
+              <a:t>Input</a:t>
+            </a:r>
+            <a:r>
+              <a:rPr lang="it-IT" sz="1600" dirty="0">
+                <a:solidFill>
+                  <a:srgbClr val="D4D4D4"/>
+                </a:solidFill>
+                <a:latin typeface="Consolas" panose="020B0609020204030204" pitchFamily="49" charset="0"/>
+              </a:rPr>
+              <a:t> *</a:t>
+            </a:r>
+            <a:r>
+              <a:rPr lang="it-IT" sz="1600" dirty="0">
+                <a:solidFill>
+                  <a:srgbClr val="9CDCFE"/>
+                </a:solidFill>
+                <a:latin typeface="Consolas" panose="020B0609020204030204" pitchFamily="49" charset="0"/>
+              </a:rPr>
+              <a:t>input</a:t>
+            </a:r>
+            <a:r>
+              <a:rPr lang="it-IT" sz="1600" dirty="0">
+                <a:solidFill>
+                  <a:srgbClr val="D4D4D4"/>
+                </a:solidFill>
+                <a:latin typeface="Consolas" panose="020B0609020204030204" pitchFamily="49" charset="0"/>
+              </a:rPr>
+              <a:t>, </a:t>
+            </a:r>
+            <a:r>
+              <a:rPr lang="it-IT" sz="1600" dirty="0" err="1">
+                <a:solidFill>
+                  <a:srgbClr val="569CD6"/>
+                </a:solidFill>
+                <a:latin typeface="Consolas" panose="020B0609020204030204" pitchFamily="49" charset="0"/>
+              </a:rPr>
+              <a:t>struct</a:t>
+            </a:r>
+            <a:r>
+              <a:rPr lang="it-IT" sz="1600" dirty="0">
+                <a:solidFill>
+                  <a:srgbClr val="D4D4D4"/>
+                </a:solidFill>
+                <a:latin typeface="Consolas" panose="020B0609020204030204" pitchFamily="49" charset="0"/>
+              </a:rPr>
+              <a:t> </a:t>
+            </a:r>
+            <a:r>
+              <a:rPr lang="it-IT" sz="1600" dirty="0" err="1">
+                <a:solidFill>
+                  <a:schemeClr val="accent6"/>
+                </a:solidFill>
+                <a:latin typeface="Consolas" panose="020B0609020204030204" pitchFamily="49" charset="0"/>
+              </a:rPr>
+              <a:t>svc_req</a:t>
+            </a:r>
+            <a:r>
+              <a:rPr lang="it-IT" sz="1600" dirty="0">
+                <a:solidFill>
+                  <a:schemeClr val="accent6"/>
+                </a:solidFill>
+                <a:latin typeface="Consolas" panose="020B0609020204030204" pitchFamily="49" charset="0"/>
+              </a:rPr>
+              <a:t> </a:t>
+            </a:r>
+            <a:r>
+              <a:rPr lang="it-IT" sz="1600" dirty="0">
+                <a:solidFill>
+                  <a:srgbClr val="D4D4D4"/>
+                </a:solidFill>
+                <a:latin typeface="Consolas" panose="020B0609020204030204" pitchFamily="49" charset="0"/>
+              </a:rPr>
+              <a:t>*</a:t>
+            </a:r>
+            <a:r>
+              <a:rPr lang="it-IT" sz="1600" dirty="0" err="1">
+                <a:solidFill>
+                  <a:srgbClr val="9CDCFE"/>
+                </a:solidFill>
+                <a:latin typeface="Consolas" panose="020B0609020204030204" pitchFamily="49" charset="0"/>
+              </a:rPr>
+              <a:t>rqstp</a:t>
+            </a:r>
+            <a:r>
+              <a:rPr lang="it-IT" sz="1600" dirty="0">
+                <a:solidFill>
+                  <a:srgbClr val="D4D4D4"/>
+                </a:solidFill>
+                <a:latin typeface="Consolas" panose="020B0609020204030204" pitchFamily="49" charset="0"/>
+              </a:rPr>
+              <a:t>)</a:t>
+            </a:r>
+            <a:r>
+              <a:rPr lang="it-IT" sz="1600" dirty="0">
+                <a:solidFill>
+                  <a:schemeClr val="bg1"/>
+                </a:solidFill>
+                <a:latin typeface="Avenir Next LT Pro Light" panose="020B0304020202020204" pitchFamily="34" charset="0"/>
+                <a:ea typeface="Calibri" panose="020F0502020204030204" pitchFamily="34" charset="0"/>
+                <a:cs typeface="Times New Roman" panose="02020603050405020304" pitchFamily="18" charset="0"/>
+              </a:rPr>
+              <a:t>: si verifica l’esistenza del partecipante passato dal Client e si </a:t>
+            </a:r>
+            <a:r>
+              <a:rPr lang="it-IT" sz="1600">
+                <a:solidFill>
+                  <a:schemeClr val="bg1"/>
+                </a:solidFill>
+                <a:latin typeface="Avenir Next LT Pro Light" panose="020B0304020202020204" pitchFamily="34" charset="0"/>
+                <a:ea typeface="Calibri" panose="020F0502020204030204" pitchFamily="34" charset="0"/>
+                <a:cs typeface="Times New Roman" panose="02020603050405020304" pitchFamily="18" charset="0"/>
+              </a:rPr>
+              <a:t>aggiunge o sottrae </a:t>
+            </a:r>
+            <a:r>
+              <a:rPr lang="it-IT" sz="1600" dirty="0">
+                <a:solidFill>
+                  <a:schemeClr val="bg1"/>
+                </a:solidFill>
+                <a:latin typeface="Avenir Next LT Pro Light" panose="020B0304020202020204" pitchFamily="34" charset="0"/>
+                <a:ea typeface="Calibri" panose="020F0502020204030204" pitchFamily="34" charset="0"/>
+                <a:cs typeface="Times New Roman" panose="02020603050405020304" pitchFamily="18" charset="0"/>
+              </a:rPr>
+              <a:t>un voto, restituendo al Client un valore diverso da -1.</a:t>
+            </a:r>
+          </a:p>
+          <a:p>
+            <a:pPr algn="just">
+              <a:lnSpc>
+                <a:spcPct val="150000"/>
+              </a:lnSpc>
+              <a:spcAft>
+                <a:spcPts val="0"/>
+              </a:spcAft>
+            </a:pPr>
+            <a:endParaRPr lang="it-IT" dirty="0">
+              <a:solidFill>
+                <a:schemeClr val="bg1"/>
+              </a:solidFill>
+              <a:latin typeface="Avenir Next LT Pro Light" panose="020B0304020202020204" pitchFamily="34" charset="0"/>
+              <a:ea typeface="Calibri" panose="020F0502020204030204" pitchFamily="34" charset="0"/>
+              <a:cs typeface="Times New Roman" panose="02020603050405020304" pitchFamily="18" charset="0"/>
+            </a:endParaRPr>
+          </a:p>
+          <a:p>
+            <a:pPr algn="just">
+              <a:lnSpc>
+                <a:spcPct val="150000"/>
+              </a:lnSpc>
+              <a:spcAft>
+                <a:spcPts val="0"/>
+              </a:spcAft>
+            </a:pPr>
+            <a:endParaRPr lang="it-IT" dirty="0">
+              <a:solidFill>
+                <a:schemeClr val="bg1"/>
+              </a:solidFill>
+              <a:latin typeface="Avenir Next LT Pro Light" panose="020B0304020202020204" pitchFamily="34" charset="0"/>
+              <a:ea typeface="Calibri" panose="020F0502020204030204" pitchFamily="34" charset="0"/>
+              <a:cs typeface="Times New Roman" panose="02020603050405020304" pitchFamily="18" charset="0"/>
+            </a:endParaRPr>
           </a:p>
         </p:txBody>
       </p:sp>

</xml_diff>